<commit_message>
rephrased forest quality to forest value in figure 1 workflow
</commit_message>
<xml_diff>
--- a/docs/figures/figure_1_workflow.pptx
+++ b/docs/figures/figure_1_workflow.pptx
@@ -404,7 +404,7 @@
           <a:p>
             <a:fld id="{EE92E66F-5F57-F44B-BA61-32227D1D992C}" type="datetimeFigureOut">
               <a:rPr lang="en-US" smtClean="0"/>
-              <a:t>8/9/2022</a:t>
+              <a:t>9/26/2023</a:t>
             </a:fld>
             <a:endParaRPr lang="en-US"/>
           </a:p>
@@ -905,7 +905,7 @@
           <a:p>
             <a:fld id="{57639F83-4504-064B-A90D-D35FBBA2BC54}" type="datetimeFigureOut">
               <a:rPr lang="en-US" smtClean="0"/>
-              <a:t>8/9/2022</a:t>
+              <a:t>9/26/2023</a:t>
             </a:fld>
             <a:endParaRPr lang="en-US"/>
           </a:p>
@@ -1105,7 +1105,7 @@
           <a:p>
             <a:fld id="{57639F83-4504-064B-A90D-D35FBBA2BC54}" type="datetimeFigureOut">
               <a:rPr lang="en-US" smtClean="0"/>
-              <a:t>8/9/2022</a:t>
+              <a:t>9/26/2023</a:t>
             </a:fld>
             <a:endParaRPr lang="en-US"/>
           </a:p>
@@ -1315,7 +1315,7 @@
           <a:p>
             <a:fld id="{57639F83-4504-064B-A90D-D35FBBA2BC54}" type="datetimeFigureOut">
               <a:rPr lang="en-US" smtClean="0"/>
-              <a:t>8/9/2022</a:t>
+              <a:t>9/26/2023</a:t>
             </a:fld>
             <a:endParaRPr lang="en-US"/>
           </a:p>
@@ -1515,7 +1515,7 @@
           <a:p>
             <a:fld id="{57639F83-4504-064B-A90D-D35FBBA2BC54}" type="datetimeFigureOut">
               <a:rPr lang="en-US" smtClean="0"/>
-              <a:t>8/9/2022</a:t>
+              <a:t>9/26/2023</a:t>
             </a:fld>
             <a:endParaRPr lang="en-US"/>
           </a:p>
@@ -1791,7 +1791,7 @@
           <a:p>
             <a:fld id="{57639F83-4504-064B-A90D-D35FBBA2BC54}" type="datetimeFigureOut">
               <a:rPr lang="en-US" smtClean="0"/>
-              <a:t>8/9/2022</a:t>
+              <a:t>9/26/2023</a:t>
             </a:fld>
             <a:endParaRPr lang="en-US"/>
           </a:p>
@@ -2059,7 +2059,7 @@
           <a:p>
             <a:fld id="{57639F83-4504-064B-A90D-D35FBBA2BC54}" type="datetimeFigureOut">
               <a:rPr lang="en-US" smtClean="0"/>
-              <a:t>8/9/2022</a:t>
+              <a:t>9/26/2023</a:t>
             </a:fld>
             <a:endParaRPr lang="en-US"/>
           </a:p>
@@ -2474,7 +2474,7 @@
           <a:p>
             <a:fld id="{57639F83-4504-064B-A90D-D35FBBA2BC54}" type="datetimeFigureOut">
               <a:rPr lang="en-US" smtClean="0"/>
-              <a:t>8/9/2022</a:t>
+              <a:t>9/26/2023</a:t>
             </a:fld>
             <a:endParaRPr lang="en-US"/>
           </a:p>
@@ -2616,7 +2616,7 @@
           <a:p>
             <a:fld id="{57639F83-4504-064B-A90D-D35FBBA2BC54}" type="datetimeFigureOut">
               <a:rPr lang="en-US" smtClean="0"/>
-              <a:t>8/9/2022</a:t>
+              <a:t>9/26/2023</a:t>
             </a:fld>
             <a:endParaRPr lang="en-US"/>
           </a:p>
@@ -2729,7 +2729,7 @@
           <a:p>
             <a:fld id="{57639F83-4504-064B-A90D-D35FBBA2BC54}" type="datetimeFigureOut">
               <a:rPr lang="en-US" smtClean="0"/>
-              <a:t>8/9/2022</a:t>
+              <a:t>9/26/2023</a:t>
             </a:fld>
             <a:endParaRPr lang="en-US"/>
           </a:p>
@@ -3042,7 +3042,7 @@
           <a:p>
             <a:fld id="{57639F83-4504-064B-A90D-D35FBBA2BC54}" type="datetimeFigureOut">
               <a:rPr lang="en-US" smtClean="0"/>
-              <a:t>8/9/2022</a:t>
+              <a:t>9/26/2023</a:t>
             </a:fld>
             <a:endParaRPr lang="en-US"/>
           </a:p>
@@ -3331,7 +3331,7 @@
           <a:p>
             <a:fld id="{57639F83-4504-064B-A90D-D35FBBA2BC54}" type="datetimeFigureOut">
               <a:rPr lang="en-US" smtClean="0"/>
-              <a:t>8/9/2022</a:t>
+              <a:t>9/26/2023</a:t>
             </a:fld>
             <a:endParaRPr lang="en-US"/>
           </a:p>
@@ -3574,7 +3574,7 @@
           <a:p>
             <a:fld id="{57639F83-4504-064B-A90D-D35FBBA2BC54}" type="datetimeFigureOut">
               <a:rPr lang="en-US" smtClean="0"/>
-              <a:t>8/9/2022</a:t>
+              <a:t>9/26/2023</a:t>
             </a:fld>
             <a:endParaRPr lang="en-US"/>
           </a:p>
@@ -4607,8 +4607,8 @@
         </p:nvSpPr>
         <p:spPr>
           <a:xfrm>
-            <a:off x="7327001" y="3999646"/>
-            <a:ext cx="3414717" cy="307777"/>
+            <a:off x="7281178" y="3817354"/>
+            <a:ext cx="3355766" cy="523220"/>
           </a:xfrm>
           <a:prstGeom prst="rect">
             <a:avLst/>
@@ -4616,16 +4616,26 @@
           <a:noFill/>
         </p:spPr>
         <p:txBody>
-          <a:bodyPr wrap="none" rtlCol="0">
+          <a:bodyPr wrap="square" rtlCol="0">
             <a:spAutoFit/>
           </a:bodyPr>
           <a:lstStyle/>
           <a:p>
+            <a:pPr algn="ctr"/>
             <a:r>
               <a:rPr lang="en-US" sz="1400" b="1" dirty="0">
                 <a:latin typeface="Helvetica" pitchFamily="2" charset="0"/>
               </a:rPr>
-              <a:t>Nationwide Forest Quality Projections</a:t>
+              <a:t>Nationwide</a:t>
+            </a:r>
+          </a:p>
+          <a:p>
+            <a:pPr algn="ctr"/>
+            <a:r>
+              <a:rPr lang="en-US" sz="1400" b="1" dirty="0">
+                <a:latin typeface="Helvetica" pitchFamily="2" charset="0"/>
+              </a:rPr>
+              <a:t>Conservation Value Projections</a:t>
             </a:r>
           </a:p>
         </p:txBody>
@@ -6467,7 +6477,7 @@
         <p:spPr>
           <a:xfrm>
             <a:off x="452867" y="1503555"/>
-            <a:ext cx="1028487" cy="307777"/>
+            <a:ext cx="955839" cy="307777"/>
           </a:xfrm>
           <a:prstGeom prst="rect">
             <a:avLst/>
@@ -6483,7 +6493,7 @@
               <a:rPr lang="en-US" sz="1400" dirty="0">
                 <a:latin typeface="Helvetica" pitchFamily="2" charset="0"/>
               </a:rPr>
-              <a:t>High quality</a:t>
+              <a:t>High Value</a:t>
             </a:r>
             <a:endParaRPr lang="en-US" sz="1400" dirty="0"/>
           </a:p>
@@ -6504,7 +6514,7 @@
         <p:spPr>
           <a:xfrm>
             <a:off x="456349" y="2269249"/>
-            <a:ext cx="988412" cy="307777"/>
+            <a:ext cx="915764" cy="307777"/>
           </a:xfrm>
           <a:prstGeom prst="rect">
             <a:avLst/>
@@ -6520,7 +6530,7 @@
               <a:rPr lang="en-US" sz="1400" dirty="0">
                 <a:latin typeface="Helvetica" pitchFamily="2" charset="0"/>
               </a:rPr>
-              <a:t>Low quality</a:t>
+              <a:t>Low Value</a:t>
             </a:r>
           </a:p>
         </p:txBody>
@@ -6958,7 +6968,7 @@
         <p:spPr>
           <a:xfrm>
             <a:off x="452867" y="291974"/>
-            <a:ext cx="5913863" cy="461665"/>
+            <a:ext cx="6264535" cy="461665"/>
           </a:xfrm>
           <a:prstGeom prst="rect">
             <a:avLst/>
@@ -6975,7 +6985,7 @@
               <a:rPr lang="en-US" sz="2400" b="1" dirty="0">
                 <a:latin typeface="Helvetica" pitchFamily="2" charset="0"/>
               </a:rPr>
-              <a:t>DK Forest Quality Projections Workflow</a:t>
+              <a:t>DK Forest Conservation Value Projections</a:t>
             </a:r>
           </a:p>
         </p:txBody>

</xml_diff>

<commit_message>
Updated region names, untouched forests and layout of Figure 1 based on co-author feedback
</commit_message>
<xml_diff>
--- a/docs/figures/figure_1_workflow.pptx
+++ b/docs/figures/figure_1_workflow.pptx
@@ -404,7 +404,7 @@
           <a:p>
             <a:fld id="{EE92E66F-5F57-F44B-BA61-32227D1D992C}" type="datetimeFigureOut">
               <a:rPr lang="en-US" smtClean="0"/>
-              <a:t>9/26/2023</a:t>
+              <a:t>12/7/2023</a:t>
             </a:fld>
             <a:endParaRPr lang="en-US"/>
           </a:p>
@@ -905,7 +905,7 @@
           <a:p>
             <a:fld id="{57639F83-4504-064B-A90D-D35FBBA2BC54}" type="datetimeFigureOut">
               <a:rPr lang="en-US" smtClean="0"/>
-              <a:t>9/26/2023</a:t>
+              <a:t>12/7/2023</a:t>
             </a:fld>
             <a:endParaRPr lang="en-US"/>
           </a:p>
@@ -1105,7 +1105,7 @@
           <a:p>
             <a:fld id="{57639F83-4504-064B-A90D-D35FBBA2BC54}" type="datetimeFigureOut">
               <a:rPr lang="en-US" smtClean="0"/>
-              <a:t>9/26/2023</a:t>
+              <a:t>12/7/2023</a:t>
             </a:fld>
             <a:endParaRPr lang="en-US"/>
           </a:p>
@@ -1315,7 +1315,7 @@
           <a:p>
             <a:fld id="{57639F83-4504-064B-A90D-D35FBBA2BC54}" type="datetimeFigureOut">
               <a:rPr lang="en-US" smtClean="0"/>
-              <a:t>9/26/2023</a:t>
+              <a:t>12/7/2023</a:t>
             </a:fld>
             <a:endParaRPr lang="en-US"/>
           </a:p>
@@ -1515,7 +1515,7 @@
           <a:p>
             <a:fld id="{57639F83-4504-064B-A90D-D35FBBA2BC54}" type="datetimeFigureOut">
               <a:rPr lang="en-US" smtClean="0"/>
-              <a:t>9/26/2023</a:t>
+              <a:t>12/7/2023</a:t>
             </a:fld>
             <a:endParaRPr lang="en-US"/>
           </a:p>
@@ -1791,7 +1791,7 @@
           <a:p>
             <a:fld id="{57639F83-4504-064B-A90D-D35FBBA2BC54}" type="datetimeFigureOut">
               <a:rPr lang="en-US" smtClean="0"/>
-              <a:t>9/26/2023</a:t>
+              <a:t>12/7/2023</a:t>
             </a:fld>
             <a:endParaRPr lang="en-US"/>
           </a:p>
@@ -2059,7 +2059,7 @@
           <a:p>
             <a:fld id="{57639F83-4504-064B-A90D-D35FBBA2BC54}" type="datetimeFigureOut">
               <a:rPr lang="en-US" smtClean="0"/>
-              <a:t>9/26/2023</a:t>
+              <a:t>12/7/2023</a:t>
             </a:fld>
             <a:endParaRPr lang="en-US"/>
           </a:p>
@@ -2474,7 +2474,7 @@
           <a:p>
             <a:fld id="{57639F83-4504-064B-A90D-D35FBBA2BC54}" type="datetimeFigureOut">
               <a:rPr lang="en-US" smtClean="0"/>
-              <a:t>9/26/2023</a:t>
+              <a:t>12/7/2023</a:t>
             </a:fld>
             <a:endParaRPr lang="en-US"/>
           </a:p>
@@ -2616,7 +2616,7 @@
           <a:p>
             <a:fld id="{57639F83-4504-064B-A90D-D35FBBA2BC54}" type="datetimeFigureOut">
               <a:rPr lang="en-US" smtClean="0"/>
-              <a:t>9/26/2023</a:t>
+              <a:t>12/7/2023</a:t>
             </a:fld>
             <a:endParaRPr lang="en-US"/>
           </a:p>
@@ -2729,7 +2729,7 @@
           <a:p>
             <a:fld id="{57639F83-4504-064B-A90D-D35FBBA2BC54}" type="datetimeFigureOut">
               <a:rPr lang="en-US" smtClean="0"/>
-              <a:t>9/26/2023</a:t>
+              <a:t>12/7/2023</a:t>
             </a:fld>
             <a:endParaRPr lang="en-US"/>
           </a:p>
@@ -3042,7 +3042,7 @@
           <a:p>
             <a:fld id="{57639F83-4504-064B-A90D-D35FBBA2BC54}" type="datetimeFigureOut">
               <a:rPr lang="en-US" smtClean="0"/>
-              <a:t>9/26/2023</a:t>
+              <a:t>12/7/2023</a:t>
             </a:fld>
             <a:endParaRPr lang="en-US"/>
           </a:p>
@@ -3331,7 +3331,7 @@
           <a:p>
             <a:fld id="{57639F83-4504-064B-A90D-D35FBBA2BC54}" type="datetimeFigureOut">
               <a:rPr lang="en-US" smtClean="0"/>
-              <a:t>9/26/2023</a:t>
+              <a:t>12/7/2023</a:t>
             </a:fld>
             <a:endParaRPr lang="en-US"/>
           </a:p>
@@ -3574,7 +3574,7 @@
           <a:p>
             <a:fld id="{57639F83-4504-064B-A90D-D35FBBA2BC54}" type="datetimeFigureOut">
               <a:rPr lang="en-US" smtClean="0"/>
-              <a:t>9/26/2023</a:t>
+              <a:t>12/7/2023</a:t>
             </a:fld>
             <a:endParaRPr lang="en-US"/>
           </a:p>
@@ -4006,7 +4006,7 @@
         <p:spPr>
           <a:xfrm>
             <a:off x="2845413" y="1262890"/>
-            <a:ext cx="1596912" cy="738664"/>
+            <a:ext cx="1606530" cy="738664"/>
           </a:xfrm>
           <a:prstGeom prst="rect">
             <a:avLst/>
@@ -4039,7 +4039,7 @@
               <a:rPr lang="en-US" sz="1400" dirty="0">
                 <a:latin typeface="Helvetica" pitchFamily="2" charset="0"/>
               </a:rPr>
-              <a:t>private old growth</a:t>
+              <a:t>private untouched</a:t>
             </a:r>
           </a:p>
         </p:txBody>
@@ -4607,7 +4607,7 @@
         </p:nvSpPr>
         <p:spPr>
           <a:xfrm>
-            <a:off x="7281178" y="3817354"/>
+            <a:off x="7355697" y="3518265"/>
             <a:ext cx="3355766" cy="523220"/>
           </a:xfrm>
           <a:prstGeom prst="rect">
@@ -6848,8 +6848,8 @@
         </p:nvCxnSpPr>
         <p:spPr>
           <a:xfrm flipH="1">
-            <a:off x="10783255" y="5382309"/>
-            <a:ext cx="718768" cy="0"/>
+            <a:off x="11063611" y="5383958"/>
+            <a:ext cx="450000" cy="0"/>
           </a:xfrm>
           <a:prstGeom prst="line">
             <a:avLst/>
@@ -6929,7 +6929,7 @@
         <p:spPr>
           <a:xfrm>
             <a:off x="6381526" y="5404178"/>
-            <a:ext cx="900000" cy="0"/>
+            <a:ext cx="450000" cy="0"/>
           </a:xfrm>
           <a:prstGeom prst="line">
             <a:avLst/>
@@ -7004,15 +7004,15 @@
           </p:cNvPicPr>
           <p:nvPr/>
         </p:nvPicPr>
-        <p:blipFill rotWithShape="1">
+        <p:blipFill>
           <a:blip r:embed="rId35"/>
-          <a:srcRect t="10063" b="8376"/>
+          <a:srcRect t="9163" b="9163"/>
           <a:stretch/>
         </p:blipFill>
         <p:spPr>
           <a:xfrm>
-            <a:off x="7373139" y="4362712"/>
-            <a:ext cx="3309628" cy="1963831"/>
+            <a:off x="7011077" y="4080616"/>
+            <a:ext cx="3949556" cy="2343544"/>
           </a:xfrm>
           <a:prstGeom prst="rect">
             <a:avLst/>

</xml_diff>

<commit_message>
updated figure 1 increasing font sizes and adding and insert with the positon of Denmark within Europe
</commit_message>
<xml_diff>
--- a/docs/figures/figure_1_workflow.pptx
+++ b/docs/figures/figure_1_workflow.pptx
@@ -404,7 +404,7 @@
           <a:p>
             <a:fld id="{EE92E66F-5F57-F44B-BA61-32227D1D992C}" type="datetimeFigureOut">
               <a:rPr lang="en-US" smtClean="0"/>
-              <a:t>12/19/2023</a:t>
+              <a:t>10/3/2024</a:t>
             </a:fld>
             <a:endParaRPr lang="en-US"/>
           </a:p>
@@ -905,7 +905,7 @@
           <a:p>
             <a:fld id="{57639F83-4504-064B-A90D-D35FBBA2BC54}" type="datetimeFigureOut">
               <a:rPr lang="en-US" smtClean="0"/>
-              <a:t>12/19/2023</a:t>
+              <a:t>10/3/2024</a:t>
             </a:fld>
             <a:endParaRPr lang="en-US"/>
           </a:p>
@@ -1105,7 +1105,7 @@
           <a:p>
             <a:fld id="{57639F83-4504-064B-A90D-D35FBBA2BC54}" type="datetimeFigureOut">
               <a:rPr lang="en-US" smtClean="0"/>
-              <a:t>12/19/2023</a:t>
+              <a:t>10/3/2024</a:t>
             </a:fld>
             <a:endParaRPr lang="en-US"/>
           </a:p>
@@ -1315,7 +1315,7 @@
           <a:p>
             <a:fld id="{57639F83-4504-064B-A90D-D35FBBA2BC54}" type="datetimeFigureOut">
               <a:rPr lang="en-US" smtClean="0"/>
-              <a:t>12/19/2023</a:t>
+              <a:t>10/3/2024</a:t>
             </a:fld>
             <a:endParaRPr lang="en-US"/>
           </a:p>
@@ -1515,7 +1515,7 @@
           <a:p>
             <a:fld id="{57639F83-4504-064B-A90D-D35FBBA2BC54}" type="datetimeFigureOut">
               <a:rPr lang="en-US" smtClean="0"/>
-              <a:t>12/19/2023</a:t>
+              <a:t>10/3/2024</a:t>
             </a:fld>
             <a:endParaRPr lang="en-US"/>
           </a:p>
@@ -1791,7 +1791,7 @@
           <a:p>
             <a:fld id="{57639F83-4504-064B-A90D-D35FBBA2BC54}" type="datetimeFigureOut">
               <a:rPr lang="en-US" smtClean="0"/>
-              <a:t>12/19/2023</a:t>
+              <a:t>10/3/2024</a:t>
             </a:fld>
             <a:endParaRPr lang="en-US"/>
           </a:p>
@@ -2059,7 +2059,7 @@
           <a:p>
             <a:fld id="{57639F83-4504-064B-A90D-D35FBBA2BC54}" type="datetimeFigureOut">
               <a:rPr lang="en-US" smtClean="0"/>
-              <a:t>12/19/2023</a:t>
+              <a:t>10/3/2024</a:t>
             </a:fld>
             <a:endParaRPr lang="en-US"/>
           </a:p>
@@ -2474,7 +2474,7 @@
           <a:p>
             <a:fld id="{57639F83-4504-064B-A90D-D35FBBA2BC54}" type="datetimeFigureOut">
               <a:rPr lang="en-US" smtClean="0"/>
-              <a:t>12/19/2023</a:t>
+              <a:t>10/3/2024</a:t>
             </a:fld>
             <a:endParaRPr lang="en-US"/>
           </a:p>
@@ -2616,7 +2616,7 @@
           <a:p>
             <a:fld id="{57639F83-4504-064B-A90D-D35FBBA2BC54}" type="datetimeFigureOut">
               <a:rPr lang="en-US" smtClean="0"/>
-              <a:t>12/19/2023</a:t>
+              <a:t>10/3/2024</a:t>
             </a:fld>
             <a:endParaRPr lang="en-US"/>
           </a:p>
@@ -2729,7 +2729,7 @@
           <a:p>
             <a:fld id="{57639F83-4504-064B-A90D-D35FBBA2BC54}" type="datetimeFigureOut">
               <a:rPr lang="en-US" smtClean="0"/>
-              <a:t>12/19/2023</a:t>
+              <a:t>10/3/2024</a:t>
             </a:fld>
             <a:endParaRPr lang="en-US"/>
           </a:p>
@@ -3042,7 +3042,7 @@
           <a:p>
             <a:fld id="{57639F83-4504-064B-A90D-D35FBBA2BC54}" type="datetimeFigureOut">
               <a:rPr lang="en-US" smtClean="0"/>
-              <a:t>12/19/2023</a:t>
+              <a:t>10/3/2024</a:t>
             </a:fld>
             <a:endParaRPr lang="en-US"/>
           </a:p>
@@ -3331,7 +3331,7 @@
           <a:p>
             <a:fld id="{57639F83-4504-064B-A90D-D35FBBA2BC54}" type="datetimeFigureOut">
               <a:rPr lang="en-US" smtClean="0"/>
-              <a:t>12/19/2023</a:t>
+              <a:t>10/3/2024</a:t>
             </a:fld>
             <a:endParaRPr lang="en-US"/>
           </a:p>
@@ -3574,7 +3574,7 @@
           <a:p>
             <a:fld id="{57639F83-4504-064B-A90D-D35FBBA2BC54}" type="datetimeFigureOut">
               <a:rPr lang="en-US" smtClean="0"/>
-              <a:t>12/19/2023</a:t>
+              <a:t>10/3/2024</a:t>
             </a:fld>
             <a:endParaRPr lang="en-US"/>
           </a:p>
@@ -4005,8 +4005,8 @@
         </p:nvSpPr>
         <p:spPr>
           <a:xfrm>
-            <a:off x="2845413" y="1262890"/>
-            <a:ext cx="1143262" cy="738664"/>
+            <a:off x="2677138" y="1331995"/>
+            <a:ext cx="1415772" cy="923330"/>
           </a:xfrm>
           <a:prstGeom prst="rect">
             <a:avLst/>
@@ -4020,7 +4020,7 @@
           <a:lstStyle/>
           <a:p>
             <a:r>
-              <a:rPr lang="en-US" sz="1400" dirty="0">
+              <a:rPr lang="en-US" dirty="0">
                 <a:latin typeface="Helvetica" pitchFamily="2" charset="0"/>
               </a:rPr>
               <a:t>§25 forests</a:t>
@@ -4028,7 +4028,7 @@
           </a:p>
           <a:p>
             <a:r>
-              <a:rPr lang="en-US" sz="1400" dirty="0">
+              <a:rPr lang="en-US" dirty="0">
                 <a:latin typeface="Helvetica" pitchFamily="2" charset="0"/>
               </a:rPr>
               <a:t>§15 forests</a:t>
@@ -4036,7 +4036,7 @@
           </a:p>
           <a:p>
             <a:r>
-              <a:rPr lang="en-US" sz="1400" dirty="0">
+              <a:rPr lang="en-US" dirty="0">
                 <a:latin typeface="Helvetica" pitchFamily="2" charset="0"/>
               </a:rPr>
               <a:t>“untouched”</a:t>
@@ -4058,8 +4058,8 @@
         </p:nvSpPr>
         <p:spPr>
           <a:xfrm>
-            <a:off x="2850954" y="2179938"/>
-            <a:ext cx="1486304" cy="523220"/>
+            <a:off x="2681403" y="2360381"/>
+            <a:ext cx="1864613" cy="646331"/>
           </a:xfrm>
           <a:prstGeom prst="rect">
             <a:avLst/>
@@ -4073,7 +4073,7 @@
           <a:lstStyle/>
           <a:p>
             <a:r>
-              <a:rPr lang="en-US" sz="1400" dirty="0">
+              <a:rPr lang="en-US" dirty="0">
                 <a:latin typeface="Helvetica" pitchFamily="2" charset="0"/>
               </a:rPr>
               <a:t>NST plantations</a:t>
@@ -4081,7 +4081,7 @@
           </a:p>
           <a:p>
             <a:r>
-              <a:rPr lang="en-US" sz="1400" dirty="0">
+              <a:rPr lang="en-US" dirty="0">
                 <a:latin typeface="Helvetica" pitchFamily="2" charset="0"/>
               </a:rPr>
               <a:t>“not §25” forests</a:t>
@@ -4103,8 +4103,8 @@
         </p:nvSpPr>
         <p:spPr>
           <a:xfrm>
-            <a:off x="498649" y="3764211"/>
-            <a:ext cx="1483098" cy="692497"/>
+            <a:off x="394382" y="3822550"/>
+            <a:ext cx="1835759" cy="861774"/>
           </a:xfrm>
           <a:prstGeom prst="rect">
             <a:avLst/>
@@ -4118,40 +4118,37 @@
           <a:lstStyle/>
           <a:p>
             <a:r>
+              <a:rPr lang="en-US" dirty="0">
+                <a:latin typeface="Helvetica" pitchFamily="2" charset="0"/>
+              </a:rPr>
+              <a:t>EcoDes-DK15</a:t>
+            </a:r>
+          </a:p>
+          <a:p>
+            <a:r>
+              <a:rPr lang="en-US" dirty="0">
+                <a:latin typeface="Helvetica" pitchFamily="2" charset="0"/>
+              </a:rPr>
+              <a:t>Airborne Lidar</a:t>
+            </a:r>
+          </a:p>
+          <a:p>
+            <a:r>
               <a:rPr lang="en-US" sz="1400" dirty="0">
                 <a:latin typeface="Helvetica" pitchFamily="2" charset="0"/>
               </a:rPr>
-              <a:t>EcoDes-DK15</a:t>
-            </a:r>
-          </a:p>
-          <a:p>
+              <a:t>(</a:t>
+            </a:r>
+            <a:r>
+              <a:rPr lang="en-US" sz="1400" dirty="0" err="1">
+                <a:latin typeface="Helvetica" pitchFamily="2" charset="0"/>
+              </a:rPr>
+              <a:t>Assman</a:t>
+            </a:r>
             <a:r>
               <a:rPr lang="en-US" sz="1400" dirty="0">
                 <a:latin typeface="Helvetica" pitchFamily="2" charset="0"/>
               </a:rPr>
-              <a:t>Airborne Lidar</a:t>
-            </a:r>
-            <a:endParaRPr lang="en-US" sz="1100" dirty="0">
-              <a:latin typeface="Helvetica" pitchFamily="2" charset="0"/>
-            </a:endParaRPr>
-          </a:p>
-          <a:p>
-            <a:r>
-              <a:rPr lang="en-US" sz="1100" dirty="0">
-                <a:latin typeface="Helvetica" pitchFamily="2" charset="0"/>
-              </a:rPr>
-              <a:t>(</a:t>
-            </a:r>
-            <a:r>
-              <a:rPr lang="en-US" sz="1100" dirty="0" err="1">
-                <a:latin typeface="Helvetica" pitchFamily="2" charset="0"/>
-              </a:rPr>
-              <a:t>Assman</a:t>
-            </a:r>
-            <a:r>
-              <a:rPr lang="en-US" sz="1100" dirty="0">
-                <a:latin typeface="Helvetica" pitchFamily="2" charset="0"/>
-              </a:rPr>
               <a:t> et al. 2022)</a:t>
             </a:r>
           </a:p>
@@ -4171,8 +4168,8 @@
         </p:nvSpPr>
         <p:spPr>
           <a:xfrm>
-            <a:off x="4696795" y="3817354"/>
-            <a:ext cx="1547218" cy="477054"/>
+            <a:off x="4787034" y="3817354"/>
+            <a:ext cx="1210716" cy="800219"/>
           </a:xfrm>
           <a:prstGeom prst="rect">
             <a:avLst/>
@@ -4186,10 +4183,33 @@
           <a:lstStyle/>
           <a:p>
             <a:r>
+              <a:rPr lang="en-US" dirty="0">
+                <a:latin typeface="Helvetica" pitchFamily="2" charset="0"/>
+              </a:rPr>
+              <a:t>Tree Type</a:t>
+            </a:r>
+            <a:br>
+              <a:rPr lang="en-US" dirty="0">
+                <a:latin typeface="Helvetica" pitchFamily="2" charset="0"/>
+              </a:rPr>
+            </a:br>
+            <a:r>
               <a:rPr lang="en-US" sz="1400" dirty="0">
                 <a:latin typeface="Helvetica" pitchFamily="2" charset="0"/>
               </a:rPr>
-              <a:t>Tree Type</a:t>
+              <a:t>(</a:t>
+            </a:r>
+            <a:r>
+              <a:rPr lang="en-US" sz="1400" dirty="0" err="1">
+                <a:latin typeface="Helvetica" pitchFamily="2" charset="0"/>
+              </a:rPr>
+              <a:t>Bjerreskov</a:t>
+            </a:r>
+            <a:r>
+              <a:rPr lang="en-US" sz="1400" dirty="0">
+                <a:latin typeface="Helvetica" pitchFamily="2" charset="0"/>
+              </a:rPr>
+              <a:t> </a:t>
             </a:r>
             <a:br>
               <a:rPr lang="en-US" sz="1400" dirty="0">
@@ -4197,16 +4217,10 @@
               </a:rPr>
             </a:br>
             <a:r>
-              <a:rPr lang="en-US" sz="1100" dirty="0" err="1">
+              <a:rPr lang="en-US" sz="1400" dirty="0">
                 <a:latin typeface="Helvetica" pitchFamily="2" charset="0"/>
               </a:rPr>
-              <a:t>Bjerreskov</a:t>
-            </a:r>
-            <a:r>
-              <a:rPr lang="en-US" sz="1100" dirty="0">
-                <a:latin typeface="Helvetica" pitchFamily="2" charset="0"/>
-              </a:rPr>
-              <a:t> et al. 2021</a:t>
+              <a:t> et al. 2021)</a:t>
             </a:r>
           </a:p>
         </p:txBody>
@@ -4225,8 +4239,8 @@
         </p:nvSpPr>
         <p:spPr>
           <a:xfrm>
-            <a:off x="3938225" y="5693761"/>
-            <a:ext cx="2351926" cy="477054"/>
+            <a:off x="3800035" y="5524943"/>
+            <a:ext cx="1596912" cy="861774"/>
           </a:xfrm>
           <a:prstGeom prst="rect">
             <a:avLst/>
@@ -4240,22 +4254,36 @@
           <a:lstStyle/>
           <a:p>
             <a:r>
+              <a:rPr lang="en-US" dirty="0">
+                <a:latin typeface="Helvetica" pitchFamily="2" charset="0"/>
+              </a:rPr>
+              <a:t>Near-surface </a:t>
+            </a:r>
+            <a:br>
+              <a:rPr lang="en-US" dirty="0">
+                <a:latin typeface="Helvetica" pitchFamily="2" charset="0"/>
+              </a:rPr>
+            </a:br>
+            <a:r>
+              <a:rPr lang="en-US" dirty="0">
+                <a:latin typeface="Helvetica" pitchFamily="2" charset="0"/>
+              </a:rPr>
+              <a:t>Groundwater </a:t>
+            </a:r>
+            <a:br>
+              <a:rPr lang="en-US" dirty="0">
+                <a:latin typeface="Helvetica" pitchFamily="2" charset="0"/>
+              </a:rPr>
+            </a:br>
+            <a:r>
               <a:rPr lang="en-US" sz="1400" dirty="0">
                 <a:latin typeface="Helvetica" pitchFamily="2" charset="0"/>
               </a:rPr>
-              <a:t>Near-surface Groundwater </a:t>
-            </a:r>
-            <a:br>
-              <a:rPr lang="en-US" sz="1400" dirty="0">
-                <a:latin typeface="Helvetica" pitchFamily="2" charset="0"/>
-              </a:rPr>
-            </a:br>
-            <a:r>
-              <a:rPr lang="en-US" sz="1100" dirty="0">
-                <a:latin typeface="Helvetica" pitchFamily="2" charset="0"/>
-              </a:rPr>
-              <a:t>Koch et al. 2021 </a:t>
-            </a:r>
+              <a:t>(Koch et al. 2021)</a:t>
+            </a:r>
+            <a:endParaRPr lang="en-US" dirty="0">
+              <a:latin typeface="Helvetica" pitchFamily="2" charset="0"/>
+            </a:endParaRPr>
           </a:p>
         </p:txBody>
       </p:sp>
@@ -4273,8 +4301,8 @@
         </p:nvSpPr>
         <p:spPr>
           <a:xfrm>
-            <a:off x="373526" y="3359284"/>
-            <a:ext cx="2255746" cy="307777"/>
+            <a:off x="205251" y="3330256"/>
+            <a:ext cx="2852063" cy="369332"/>
           </a:xfrm>
           <a:prstGeom prst="rect">
             <a:avLst/>
@@ -4288,7 +4316,7 @@
           <a:lstStyle/>
           <a:p>
             <a:r>
-              <a:rPr lang="en-US" sz="1400" b="1" dirty="0">
+              <a:rPr lang="en-US" b="1" dirty="0">
                 <a:latin typeface="Helvetica" pitchFamily="2" charset="0"/>
               </a:rPr>
               <a:t>Raster Predictors [10 m]</a:t>
@@ -4310,8 +4338,8 @@
         </p:nvSpPr>
         <p:spPr>
           <a:xfrm>
-            <a:off x="452867" y="866101"/>
-            <a:ext cx="3368679" cy="307777"/>
+            <a:off x="284592" y="935206"/>
+            <a:ext cx="4324325" cy="369332"/>
           </a:xfrm>
           <a:prstGeom prst="rect">
             <a:avLst/>
@@ -4325,7 +4353,7 @@
           <a:lstStyle/>
           <a:p>
             <a:r>
-              <a:rPr lang="en-US" sz="1400" b="1" dirty="0">
+              <a:rPr lang="en-US" b="1" dirty="0">
                 <a:latin typeface="Helvetica" pitchFamily="2" charset="0"/>
               </a:rPr>
               <a:t>Training Polygons (forest annotations)</a:t>
@@ -4347,8 +4375,8 @@
         </p:nvSpPr>
         <p:spPr>
           <a:xfrm>
-            <a:off x="8661259" y="659685"/>
-            <a:ext cx="1357936" cy="615553"/>
+            <a:off x="8224042" y="662515"/>
+            <a:ext cx="1726755" cy="800219"/>
           </a:xfrm>
           <a:prstGeom prst="rect">
             <a:avLst/>
@@ -4362,23 +4390,23 @@
           <a:lstStyle/>
           <a:p>
             <a:r>
+              <a:rPr lang="en-US" dirty="0">
+                <a:latin typeface="Helvetica" pitchFamily="2" charset="0"/>
+              </a:rPr>
+              <a:t>Model Training</a:t>
+            </a:r>
+          </a:p>
+          <a:p>
+            <a:r>
               <a:rPr lang="en-US" sz="1400" dirty="0">
                 <a:latin typeface="Helvetica" pitchFamily="2" charset="0"/>
               </a:rPr>
-              <a:t>Model Training</a:t>
-            </a:r>
-          </a:p>
-          <a:p>
-            <a:r>
-              <a:rPr lang="en-US" sz="1000" dirty="0">
-                <a:latin typeface="Helvetica" pitchFamily="2" charset="0"/>
-              </a:rPr>
               <a:t>- Gradient Boosting</a:t>
             </a:r>
           </a:p>
           <a:p>
             <a:r>
-              <a:rPr lang="en-US" sz="1000" dirty="0">
+              <a:rPr lang="en-US" sz="1400" dirty="0">
                 <a:latin typeface="Helvetica" pitchFamily="2" charset="0"/>
               </a:rPr>
               <a:t>- Random Forests</a:t>
@@ -4400,8 +4428,8 @@
         </p:nvSpPr>
         <p:spPr>
           <a:xfrm>
-            <a:off x="4452942" y="1411203"/>
-            <a:ext cx="1149674" cy="523220"/>
+            <a:off x="4284906" y="1607727"/>
+            <a:ext cx="1428597" cy="646331"/>
           </a:xfrm>
           <a:prstGeom prst="rect">
             <a:avLst/>
@@ -4416,7 +4444,7 @@
           <a:p>
             <a:pPr algn="ctr"/>
             <a:r>
-              <a:rPr lang="en-US" sz="1400" dirty="0">
+              <a:rPr lang="en-US" dirty="0">
                 <a:latin typeface="Helvetica" pitchFamily="2" charset="0"/>
               </a:rPr>
               <a:t>Sample</a:t>
@@ -4425,7 +4453,7 @@
           <a:p>
             <a:pPr algn="ctr"/>
             <a:r>
-              <a:rPr lang="en-US" sz="1400" dirty="0">
+              <a:rPr lang="en-US" dirty="0">
                 <a:latin typeface="Helvetica" pitchFamily="2" charset="0"/>
               </a:rPr>
               <a:t>(30k pixels) </a:t>
@@ -4449,13 +4477,13 @@
         </p:nvCxnSpPr>
         <p:spPr>
           <a:xfrm flipV="1">
-            <a:off x="4997674" y="2049779"/>
-            <a:ext cx="0" cy="1500715"/>
+            <a:off x="4969099" y="2285522"/>
+            <a:ext cx="0" cy="1260000"/>
           </a:xfrm>
           <a:prstGeom prst="line">
             <a:avLst/>
           </a:prstGeom>
-          <a:ln w="38100">
+          <a:ln w="57150">
             <a:solidFill>
               <a:srgbClr val="3CB0AE"/>
             </a:solidFill>
@@ -4491,8 +4519,8 @@
         </p:nvSpPr>
         <p:spPr>
           <a:xfrm>
-            <a:off x="10513471" y="626514"/>
-            <a:ext cx="1977105" cy="677108"/>
+            <a:off x="10234458" y="664103"/>
+            <a:ext cx="1977105" cy="861774"/>
           </a:xfrm>
           <a:prstGeom prst="rect">
             <a:avLst/>
@@ -4506,24 +4534,18 @@
           <a:lstStyle/>
           <a:p>
             <a:r>
+              <a:rPr lang="en-US" dirty="0">
+                <a:latin typeface="Helvetica" pitchFamily="2" charset="0"/>
+              </a:rPr>
+              <a:t>Hyperparameter Tuning </a:t>
+            </a:r>
+          </a:p>
+          <a:p>
+            <a:r>
               <a:rPr lang="en-US" sz="1400" dirty="0">
                 <a:latin typeface="Helvetica" pitchFamily="2" charset="0"/>
               </a:rPr>
-              <a:t>Hyperparameter Tuning </a:t>
-            </a:r>
-          </a:p>
-          <a:p>
-            <a:r>
-              <a:rPr lang="en-US" sz="1000">
-                <a:latin typeface="Helvetica" pitchFamily="2" charset="0"/>
-              </a:rPr>
-              <a:t>- 5-10-fold </a:t>
-            </a:r>
-            <a:r>
-              <a:rPr lang="en-US" sz="1000" dirty="0">
-                <a:latin typeface="Helvetica" pitchFamily="2" charset="0"/>
-              </a:rPr>
-              <a:t>CV</a:t>
+              <a:t>- 5x-10x CV</a:t>
             </a:r>
           </a:p>
         </p:txBody>
@@ -4542,8 +4564,8 @@
         </p:nvSpPr>
         <p:spPr>
           <a:xfrm>
-            <a:off x="8860961" y="2334269"/>
-            <a:ext cx="958532" cy="615553"/>
+            <a:off x="8621216" y="2329588"/>
+            <a:ext cx="1180644" cy="800219"/>
           </a:xfrm>
           <a:prstGeom prst="rect">
             <a:avLst/>
@@ -4557,23 +4579,23 @@
           <a:lstStyle/>
           <a:p>
             <a:r>
+              <a:rPr lang="en-US" dirty="0">
+                <a:latin typeface="Helvetica" pitchFamily="2" charset="0"/>
+              </a:rPr>
+              <a:t>Validation</a:t>
+            </a:r>
+          </a:p>
+          <a:p>
+            <a:r>
               <a:rPr lang="en-US" sz="1400" dirty="0">
                 <a:latin typeface="Helvetica" pitchFamily="2" charset="0"/>
               </a:rPr>
-              <a:t>Validation</a:t>
-            </a:r>
-          </a:p>
-          <a:p>
-            <a:r>
-              <a:rPr lang="en-US" sz="1000" dirty="0">
-                <a:latin typeface="Helvetica" pitchFamily="2" charset="0"/>
-              </a:rPr>
               <a:t>- nationwide</a:t>
             </a:r>
           </a:p>
           <a:p>
             <a:r>
-              <a:rPr lang="en-US" sz="1000" dirty="0">
+              <a:rPr lang="en-US" sz="1400" dirty="0">
                 <a:latin typeface="Helvetica" pitchFamily="2" charset="0"/>
               </a:rPr>
               <a:t>- by region</a:t>
@@ -4595,8 +4617,8 @@
         </p:nvSpPr>
         <p:spPr>
           <a:xfrm>
-            <a:off x="7355697" y="3518265"/>
-            <a:ext cx="3355766" cy="523220"/>
+            <a:off x="7135207" y="3603873"/>
+            <a:ext cx="3707914" cy="646331"/>
           </a:xfrm>
           <a:prstGeom prst="rect">
             <a:avLst/>
@@ -4611,7 +4633,7 @@
           <a:p>
             <a:pPr algn="ctr"/>
             <a:r>
-              <a:rPr lang="en-US" sz="1400" b="1" dirty="0">
+              <a:rPr lang="en-US" b="1" dirty="0">
                 <a:latin typeface="Helvetica" pitchFamily="2" charset="0"/>
               </a:rPr>
               <a:t>Nationwide</a:t>
@@ -4620,7 +4642,7 @@
           <a:p>
             <a:pPr algn="ctr"/>
             <a:r>
-              <a:rPr lang="en-US" sz="1400" b="1" dirty="0">
+              <a:rPr lang="en-US" b="1" dirty="0">
                 <a:latin typeface="Helvetica" pitchFamily="2" charset="0"/>
               </a:rPr>
               <a:t>Conservation Value Projections</a:t>
@@ -4642,7 +4664,7 @@
         </p:nvGrpSpPr>
         <p:grpSpPr>
           <a:xfrm>
-            <a:off x="1939517" y="4153367"/>
+            <a:off x="2117167" y="3943646"/>
             <a:ext cx="1171047" cy="958855"/>
             <a:chOff x="16951969" y="14843696"/>
             <a:chExt cx="2558982" cy="2095298"/>
@@ -4928,7 +4950,7 @@
         </p:blipFill>
         <p:spPr>
           <a:xfrm>
-            <a:off x="4444742" y="4514457"/>
+            <a:off x="4276467" y="4514457"/>
             <a:ext cx="552932" cy="597765"/>
           </a:xfrm>
           <a:prstGeom prst="rect">
@@ -4964,7 +4986,7 @@
         </p:blipFill>
         <p:spPr>
           <a:xfrm>
-            <a:off x="3877628" y="3967387"/>
+            <a:off x="3709353" y="3967387"/>
             <a:ext cx="360431" cy="620097"/>
           </a:xfrm>
           <a:prstGeom prst="rect">
@@ -4988,7 +5010,7 @@
         </p:nvCxnSpPr>
         <p:spPr>
           <a:xfrm flipV="1">
-            <a:off x="4193552" y="4096746"/>
+            <a:off x="4025277" y="4096746"/>
             <a:ext cx="337681" cy="793819"/>
           </a:xfrm>
           <a:prstGeom prst="line">
@@ -5029,7 +5051,7 @@
         </p:nvGrpSpPr>
         <p:grpSpPr>
           <a:xfrm>
-            <a:off x="2866517" y="5038518"/>
+            <a:off x="2698242" y="5082968"/>
             <a:ext cx="1052295" cy="851243"/>
             <a:chOff x="2656146" y="4852509"/>
             <a:chExt cx="1052295" cy="851243"/>
@@ -5570,13 +5592,13 @@
         </p:nvCxnSpPr>
         <p:spPr>
           <a:xfrm>
-            <a:off x="5652309" y="2785615"/>
-            <a:ext cx="0" cy="764879"/>
+            <a:off x="5623734" y="3005164"/>
+            <a:ext cx="0" cy="540000"/>
           </a:xfrm>
           <a:prstGeom prst="line">
             <a:avLst/>
           </a:prstGeom>
-          <a:ln w="38100">
+          <a:ln w="57150">
             <a:solidFill>
               <a:srgbClr val="D67D49"/>
             </a:solidFill>
@@ -5613,7 +5635,7 @@
         </p:nvSpPr>
         <p:spPr>
           <a:xfrm>
-            <a:off x="468494" y="3711261"/>
+            <a:off x="300219" y="3711261"/>
             <a:ext cx="5775519" cy="2922124"/>
           </a:xfrm>
           <a:prstGeom prst="rect">
@@ -5676,13 +5698,13 @@
         </p:nvCxnSpPr>
         <p:spPr>
           <a:xfrm>
-            <a:off x="5605304" y="1661553"/>
+            <a:off x="5576729" y="1858077"/>
             <a:ext cx="865154" cy="1660"/>
           </a:xfrm>
           <a:prstGeom prst="line">
             <a:avLst/>
           </a:prstGeom>
-          <a:ln w="38100">
+          <a:ln w="57150">
             <a:solidFill>
               <a:schemeClr val="tx1"/>
             </a:solidFill>
@@ -5719,13 +5741,13 @@
         </p:nvCxnSpPr>
         <p:spPr>
           <a:xfrm flipV="1">
-            <a:off x="6440577" y="1659889"/>
+            <a:off x="6389142" y="1870699"/>
             <a:ext cx="0" cy="827200"/>
           </a:xfrm>
           <a:prstGeom prst="line">
             <a:avLst/>
           </a:prstGeom>
-          <a:ln w="38100">
+          <a:ln w="57150">
             <a:solidFill>
               <a:schemeClr val="tx1"/>
             </a:solidFill>
@@ -5762,13 +5784,13 @@
         </p:nvCxnSpPr>
         <p:spPr>
           <a:xfrm flipV="1">
-            <a:off x="6467780" y="1661637"/>
-            <a:ext cx="453816" cy="1946"/>
+            <a:off x="6416345" y="1858161"/>
+            <a:ext cx="360000" cy="1946"/>
           </a:xfrm>
           <a:prstGeom prst="line">
             <a:avLst/>
           </a:prstGeom>
-          <a:ln w="38100">
+          <a:ln w="57150">
             <a:solidFill>
               <a:schemeClr val="tx1"/>
             </a:solidFill>
@@ -5806,13 +5828,13 @@
         </p:nvCxnSpPr>
         <p:spPr>
           <a:xfrm>
-            <a:off x="8081805" y="814088"/>
-            <a:ext cx="540834" cy="2910"/>
+            <a:off x="7834149" y="1010612"/>
+            <a:ext cx="360000" cy="0"/>
           </a:xfrm>
           <a:prstGeom prst="line">
             <a:avLst/>
           </a:prstGeom>
-          <a:ln w="38100">
+          <a:ln w="57150">
             <a:tailEnd type="triangle"/>
           </a:ln>
         </p:spPr>
@@ -5845,8 +5867,8 @@
         </p:nvSpPr>
         <p:spPr>
           <a:xfrm>
-            <a:off x="10918369" y="2366133"/>
-            <a:ext cx="1167307" cy="307777"/>
+            <a:off x="10556781" y="2512736"/>
+            <a:ext cx="1454244" cy="369332"/>
           </a:xfrm>
           <a:prstGeom prst="rect">
             <a:avLst/>
@@ -5863,7 +5885,7 @@
           <a:lstStyle/>
           <a:p>
             <a:r>
-              <a:rPr lang="en-US" sz="1400" b="1" dirty="0">
+              <a:rPr lang="en-US" b="1" dirty="0">
                 <a:solidFill>
                   <a:srgbClr val="7030A0"/>
                 </a:solidFill>
@@ -5890,13 +5912,13 @@
         </p:nvCxnSpPr>
         <p:spPr>
           <a:xfrm>
-            <a:off x="11502023" y="933305"/>
+            <a:off x="11502023" y="1129829"/>
             <a:ext cx="0" cy="1347541"/>
           </a:xfrm>
           <a:prstGeom prst="line">
             <a:avLst/>
           </a:prstGeom>
-          <a:ln w="38100">
+          <a:ln w="57150">
             <a:tailEnd type="triangle"/>
           </a:ln>
         </p:spPr>
@@ -5929,7 +5951,7 @@
         </p:nvSpPr>
         <p:spPr>
           <a:xfrm>
-            <a:off x="7469447" y="2323213"/>
+            <a:off x="7271003" y="2519737"/>
             <a:ext cx="583814" cy="369332"/>
           </a:xfrm>
           <a:prstGeom prst="rect">
@@ -5964,7 +5986,7 @@
         </p:nvSpPr>
         <p:spPr>
           <a:xfrm>
-            <a:off x="7469447" y="633549"/>
+            <a:off x="7271003" y="830073"/>
             <a:ext cx="583814" cy="369332"/>
           </a:xfrm>
           <a:prstGeom prst="rect">
@@ -5999,7 +6021,7 @@
         </p:nvGrpSpPr>
         <p:grpSpPr>
           <a:xfrm>
-            <a:off x="1570443" y="1315280"/>
+            <a:off x="1402168" y="1485146"/>
             <a:ext cx="1140624" cy="598212"/>
             <a:chOff x="1733547" y="1781916"/>
             <a:chExt cx="1140624" cy="598212"/>
@@ -6164,7 +6186,7 @@
         </p:nvGrpSpPr>
         <p:grpSpPr>
           <a:xfrm>
-            <a:off x="1654380" y="2151716"/>
+            <a:off x="1484829" y="2422524"/>
             <a:ext cx="1121060" cy="506606"/>
             <a:chOff x="1644151" y="2554454"/>
             <a:chExt cx="1121060" cy="506606"/>
@@ -6329,8 +6351,8 @@
         </p:nvSpPr>
         <p:spPr>
           <a:xfrm>
-            <a:off x="1020195" y="5481358"/>
-            <a:ext cx="1906291" cy="861774"/>
+            <a:off x="660852" y="5326182"/>
+            <a:ext cx="2292615" cy="1077218"/>
           </a:xfrm>
           <a:prstGeom prst="rect">
             <a:avLst/>
@@ -6344,10 +6366,38 @@
           <a:lstStyle/>
           <a:p>
             <a:r>
+              <a:rPr lang="en-US" dirty="0">
+                <a:latin typeface="Helvetica" pitchFamily="2" charset="0"/>
+              </a:rPr>
+              <a:t>Soil: Clay, Sand &amp; </a:t>
+            </a:r>
+            <a:br>
+              <a:rPr lang="en-US" dirty="0">
+                <a:latin typeface="Helvetica" pitchFamily="2" charset="0"/>
+              </a:rPr>
+            </a:br>
+            <a:r>
+              <a:rPr lang="en-US" dirty="0">
+                <a:latin typeface="Helvetica" pitchFamily="2" charset="0"/>
+              </a:rPr>
+              <a:t>Organic Matter </a:t>
+            </a:r>
+            <a:br>
+              <a:rPr lang="en-US" dirty="0">
+                <a:latin typeface="Helvetica" pitchFamily="2" charset="0"/>
+              </a:rPr>
+            </a:br>
+            <a:r>
+              <a:rPr lang="en-US" sz="1400" dirty="0" err="1">
+                <a:latin typeface="Helvetica" pitchFamily="2" charset="0"/>
+              </a:rPr>
+              <a:t>downsampled</a:t>
+            </a:r>
+            <a:r>
               <a:rPr lang="en-US" sz="1400" dirty="0">
                 <a:latin typeface="Helvetica" pitchFamily="2" charset="0"/>
               </a:rPr>
-              <a:t>Soil: Clay, Sand &amp; </a:t>
+              <a:t> from 250 m </a:t>
             </a:r>
             <a:br>
               <a:rPr lang="en-US" sz="1400" dirty="0">
@@ -6358,48 +6408,23 @@
               <a:rPr lang="en-US" sz="1400" dirty="0">
                 <a:latin typeface="Helvetica" pitchFamily="2" charset="0"/>
               </a:rPr>
-              <a:t>Organic Matter </a:t>
-            </a:r>
-            <a:br>
+              <a:t>(</a:t>
+            </a:r>
+            <a:r>
+              <a:rPr lang="en-US" sz="1400" dirty="0" err="1">
+                <a:latin typeface="Helvetica" pitchFamily="2" charset="0"/>
+              </a:rPr>
+              <a:t>Poggio</a:t>
+            </a:r>
+            <a:r>
               <a:rPr lang="en-US" sz="1400" dirty="0">
                 <a:latin typeface="Helvetica" pitchFamily="2" charset="0"/>
               </a:rPr>
-            </a:br>
-            <a:r>
-              <a:rPr lang="en-US" sz="1100" dirty="0" err="1">
-                <a:latin typeface="Helvetica" pitchFamily="2" charset="0"/>
-              </a:rPr>
-              <a:t>Downsampled</a:t>
-            </a:r>
-            <a:r>
-              <a:rPr lang="en-US" sz="1100" dirty="0">
-                <a:latin typeface="Helvetica" pitchFamily="2" charset="0"/>
-              </a:rPr>
-              <a:t> from 250 m </a:t>
-            </a:r>
-            <a:br>
-              <a:rPr lang="en-US" sz="1100" dirty="0">
-                <a:latin typeface="Helvetica" pitchFamily="2" charset="0"/>
-              </a:rPr>
-            </a:br>
-            <a:r>
-              <a:rPr lang="en-US" sz="1100" dirty="0">
-                <a:latin typeface="Helvetica" pitchFamily="2" charset="0"/>
-              </a:rPr>
-              <a:t>(</a:t>
-            </a:r>
-            <a:r>
-              <a:rPr lang="en-US" sz="1100" dirty="0" err="1">
-                <a:latin typeface="Helvetica" pitchFamily="2" charset="0"/>
-              </a:rPr>
-              <a:t>Poggio</a:t>
-            </a:r>
-            <a:r>
-              <a:rPr lang="en-US" sz="1100" dirty="0">
-                <a:latin typeface="Helvetica" pitchFamily="2" charset="0"/>
-              </a:rPr>
               <a:t> et al. 2021)</a:t>
             </a:r>
+            <a:endParaRPr lang="en-US" dirty="0">
+              <a:latin typeface="Helvetica" pitchFamily="2" charset="0"/>
+            </a:endParaRPr>
           </a:p>
         </p:txBody>
       </p:sp>
@@ -6417,8 +6442,8 @@
         </p:nvSpPr>
         <p:spPr>
           <a:xfrm>
-            <a:off x="5149210" y="2164306"/>
-            <a:ext cx="1149674" cy="523220"/>
+            <a:off x="4981174" y="2360830"/>
+            <a:ext cx="1428597" cy="646331"/>
           </a:xfrm>
           <a:prstGeom prst="rect">
             <a:avLst/>
@@ -6433,7 +6458,7 @@
           <a:p>
             <a:pPr algn="ctr"/>
             <a:r>
-              <a:rPr lang="en-US" sz="1400" dirty="0">
+              <a:rPr lang="en-US" dirty="0">
                 <a:latin typeface="Helvetica" pitchFamily="2" charset="0"/>
               </a:rPr>
               <a:t>Sample</a:t>
@@ -6442,7 +6467,7 @@
           <a:p>
             <a:pPr algn="ctr"/>
             <a:r>
-              <a:rPr lang="en-US" sz="1400" dirty="0">
+              <a:rPr lang="en-US" dirty="0">
                 <a:latin typeface="Helvetica" pitchFamily="2" charset="0"/>
               </a:rPr>
               <a:t>(30k pixels) </a:t>
@@ -6464,8 +6489,8 @@
         </p:nvSpPr>
         <p:spPr>
           <a:xfrm>
-            <a:off x="452867" y="1503555"/>
-            <a:ext cx="955839" cy="307777"/>
+            <a:off x="284592" y="1673421"/>
+            <a:ext cx="1203727" cy="369332"/>
           </a:xfrm>
           <a:prstGeom prst="rect">
             <a:avLst/>
@@ -6478,12 +6503,12 @@
           <a:lstStyle/>
           <a:p>
             <a:r>
-              <a:rPr lang="en-US" sz="1400" dirty="0">
+              <a:rPr lang="en-US" dirty="0">
                 <a:latin typeface="Helvetica" pitchFamily="2" charset="0"/>
               </a:rPr>
               <a:t>High Value</a:t>
             </a:r>
-            <a:endParaRPr lang="en-US" sz="1400" dirty="0"/>
+            <a:endParaRPr lang="en-US" dirty="0"/>
           </a:p>
         </p:txBody>
       </p:sp>
@@ -6501,8 +6526,8 @@
         </p:nvSpPr>
         <p:spPr>
           <a:xfrm>
-            <a:off x="456349" y="2269249"/>
-            <a:ext cx="915764" cy="307777"/>
+            <a:off x="286798" y="2540057"/>
+            <a:ext cx="1152431" cy="369332"/>
           </a:xfrm>
           <a:prstGeom prst="rect">
             <a:avLst/>
@@ -6515,7 +6540,7 @@
           <a:lstStyle/>
           <a:p>
             <a:r>
-              <a:rPr lang="en-US" sz="1400" dirty="0">
+              <a:rPr lang="en-US" dirty="0">
                 <a:latin typeface="Helvetica" pitchFamily="2" charset="0"/>
               </a:rPr>
               <a:t>Low Value</a:t>
@@ -6537,8 +6562,8 @@
         </p:nvSpPr>
         <p:spPr>
           <a:xfrm>
-            <a:off x="6937593" y="1406605"/>
-            <a:ext cx="1558440" cy="523220"/>
+            <a:off x="6749137" y="1555504"/>
+            <a:ext cx="1954381" cy="646331"/>
           </a:xfrm>
           <a:prstGeom prst="rect">
             <a:avLst/>
@@ -6553,18 +6578,18 @@
           <a:p>
             <a:pPr algn="ctr"/>
             <a:r>
-              <a:rPr lang="en-US" sz="1400" dirty="0">
+              <a:rPr lang="en-US" dirty="0">
                 <a:latin typeface="Helvetica" pitchFamily="2" charset="0"/>
               </a:rPr>
               <a:t>Split: Geographic</a:t>
             </a:r>
             <a:br>
-              <a:rPr lang="en-US" sz="1400" dirty="0">
+              <a:rPr lang="en-US" dirty="0">
                 <a:latin typeface="Helvetica" pitchFamily="2" charset="0"/>
               </a:rPr>
             </a:br>
             <a:r>
-              <a:rPr lang="en-US" sz="1400" dirty="0">
+              <a:rPr lang="en-US" dirty="0">
                 <a:latin typeface="Helvetica" pitchFamily="2" charset="0"/>
               </a:rPr>
               <a:t>Stratification</a:t>
@@ -6588,13 +6613,13 @@
         </p:nvCxnSpPr>
         <p:spPr>
           <a:xfrm rot="5400000" flipV="1">
-            <a:off x="7548058" y="2112005"/>
+            <a:off x="7349614" y="2372029"/>
             <a:ext cx="337681" cy="1"/>
           </a:xfrm>
           <a:prstGeom prst="line">
             <a:avLst/>
           </a:prstGeom>
-          <a:ln w="38100">
+          <a:ln w="57150">
             <a:tailEnd type="triangle"/>
           </a:ln>
         </p:spPr>
@@ -6629,13 +6654,13 @@
         </p:nvCxnSpPr>
         <p:spPr>
           <a:xfrm rot="16200000" flipV="1">
-            <a:off x="7528516" y="1187590"/>
+            <a:off x="7344358" y="1384114"/>
             <a:ext cx="337681" cy="1"/>
           </a:xfrm>
           <a:prstGeom prst="line">
             <a:avLst/>
           </a:prstGeom>
-          <a:ln w="38100">
+          <a:ln w="57150">
             <a:tailEnd type="triangle"/>
           </a:ln>
         </p:spPr>
@@ -6670,13 +6695,13 @@
         </p:nvCxnSpPr>
         <p:spPr>
           <a:xfrm>
-            <a:off x="6265984" y="2475095"/>
+            <a:off x="6237409" y="2672845"/>
             <a:ext cx="174593" cy="0"/>
           </a:xfrm>
           <a:prstGeom prst="line">
             <a:avLst/>
           </a:prstGeom>
-          <a:ln w="38100">
+          <a:ln w="57150">
             <a:solidFill>
               <a:schemeClr val="tx1"/>
             </a:solidFill>
@@ -6713,13 +6738,13 @@
         </p:nvCxnSpPr>
         <p:spPr>
           <a:xfrm>
-            <a:off x="8083779" y="2487165"/>
+            <a:off x="7874223" y="2712267"/>
             <a:ext cx="708893" cy="0"/>
           </a:xfrm>
           <a:prstGeom prst="line">
             <a:avLst/>
           </a:prstGeom>
-          <a:ln w="38100">
+          <a:ln w="57150">
             <a:tailEnd type="triangle"/>
           </a:ln>
         </p:spPr>
@@ -6754,13 +6779,13 @@
         </p:nvCxnSpPr>
         <p:spPr>
           <a:xfrm>
-            <a:off x="9996980" y="816998"/>
-            <a:ext cx="538706" cy="4127"/>
+            <a:off x="9923401" y="1006485"/>
+            <a:ext cx="360000" cy="4127"/>
           </a:xfrm>
           <a:prstGeom prst="line">
             <a:avLst/>
           </a:prstGeom>
-          <a:ln w="38100">
+          <a:ln w="57150">
             <a:tailEnd type="triangle"/>
           </a:ln>
         </p:spPr>
@@ -6795,13 +6820,13 @@
         </p:nvCxnSpPr>
         <p:spPr>
           <a:xfrm flipH="1">
-            <a:off x="9964011" y="2507879"/>
-            <a:ext cx="900000" cy="0"/>
+            <a:off x="9792555" y="2712342"/>
+            <a:ext cx="720000" cy="0"/>
           </a:xfrm>
           <a:prstGeom prst="line">
             <a:avLst/>
           </a:prstGeom>
-          <a:ln w="38100">
+          <a:ln w="57150">
             <a:tailEnd type="triangle"/>
           </a:ln>
         </p:spPr>
@@ -6836,13 +6861,13 @@
         </p:nvCxnSpPr>
         <p:spPr>
           <a:xfrm flipH="1">
-            <a:off x="11063611" y="5383958"/>
+            <a:off x="11063611" y="5580482"/>
             <a:ext cx="450000" cy="0"/>
           </a:xfrm>
           <a:prstGeom prst="line">
             <a:avLst/>
           </a:prstGeom>
-          <a:ln w="38100">
+          <a:ln w="57150">
             <a:tailEnd type="triangle"/>
           </a:ln>
         </p:spPr>
@@ -6877,13 +6902,13 @@
         </p:nvCxnSpPr>
         <p:spPr>
           <a:xfrm flipV="1">
-            <a:off x="11502023" y="2729691"/>
+            <a:off x="11502023" y="2926215"/>
             <a:ext cx="0" cy="2663108"/>
           </a:xfrm>
           <a:prstGeom prst="line">
             <a:avLst/>
           </a:prstGeom>
-          <a:ln w="38100"/>
+          <a:ln w="57150"/>
         </p:spPr>
         <p:style>
           <a:lnRef idx="1">
@@ -6916,13 +6941,13 @@
         </p:nvCxnSpPr>
         <p:spPr>
           <a:xfrm>
-            <a:off x="6381526" y="5404178"/>
-            <a:ext cx="450000" cy="0"/>
+            <a:off x="6271281" y="5600702"/>
+            <a:ext cx="540000" cy="0"/>
           </a:xfrm>
           <a:prstGeom prst="line">
             <a:avLst/>
           </a:prstGeom>
-          <a:ln w="38100">
+          <a:ln w="57150">
             <a:tailEnd type="triangle"/>
           </a:ln>
         </p:spPr>
@@ -6955,8 +6980,8 @@
         </p:nvSpPr>
         <p:spPr>
           <a:xfrm>
-            <a:off x="452867" y="291974"/>
-            <a:ext cx="6264535" cy="461665"/>
+            <a:off x="262367" y="136399"/>
+            <a:ext cx="7303666" cy="523220"/>
           </a:xfrm>
           <a:prstGeom prst="rect">
             <a:avLst/>
@@ -6970,7 +6995,7 @@
           <a:lstStyle/>
           <a:p>
             <a:r>
-              <a:rPr lang="en-US" sz="2400" b="1" dirty="0">
+              <a:rPr lang="en-US" sz="2800" b="1" dirty="0">
                 <a:latin typeface="Helvetica" pitchFamily="2" charset="0"/>
               </a:rPr>
               <a:t>DK Forest Conservation Value Projections</a:t>
@@ -6999,8 +7024,42 @@
         </p:blipFill>
         <p:spPr>
           <a:xfrm>
-            <a:off x="7011077" y="4080616"/>
+            <a:off x="7011077" y="4277140"/>
             <a:ext cx="3949556" cy="2343544"/>
+          </a:xfrm>
+          <a:prstGeom prst="rect">
+            <a:avLst/>
+          </a:prstGeom>
+          <a:ln w="28575">
+            <a:solidFill>
+              <a:schemeClr val="tx1"/>
+            </a:solidFill>
+          </a:ln>
+        </p:spPr>
+      </p:pic>
+      <p:pic>
+        <p:nvPicPr>
+          <p:cNvPr id="3" name="Picture 2">
+            <a:extLst>
+              <a:ext uri="{FF2B5EF4-FFF2-40B4-BE49-F238E27FC236}">
+                <a16:creationId xmlns:a16="http://schemas.microsoft.com/office/drawing/2014/main" id="{A0EB0721-75FF-DAF7-3C02-D80E0569D92E}"/>
+              </a:ext>
+            </a:extLst>
+          </p:cNvPr>
+          <p:cNvPicPr>
+            <a:picLocks noChangeAspect="1"/>
+          </p:cNvPicPr>
+          <p:nvPr/>
+        </p:nvPicPr>
+        <p:blipFill>
+          <a:blip r:embed="rId36"/>
+          <a:srcRect/>
+          <a:stretch/>
+        </p:blipFill>
+        <p:spPr>
+          <a:xfrm>
+            <a:off x="10245803" y="4280536"/>
+            <a:ext cx="708150" cy="839372"/>
           </a:xfrm>
           <a:prstGeom prst="rect">
             <a:avLst/>

</xml_diff>

<commit_message>
one more small adjustment to fig 1
</commit_message>
<xml_diff>
--- a/docs/figures/figure_1_workflow.pptx
+++ b/docs/figures/figure_1_workflow.pptx
@@ -5828,7 +5828,7 @@
         </p:nvCxnSpPr>
         <p:spPr>
           <a:xfrm>
-            <a:off x="7834149" y="1010612"/>
+            <a:off x="7843674" y="1010612"/>
             <a:ext cx="360000" cy="0"/>
           </a:xfrm>
           <a:prstGeom prst="line">
@@ -6765,47 +6765,6 @@
       </p:cxnSp>
       <p:cxnSp>
         <p:nvCxnSpPr>
-          <p:cNvPr id="91" name="Straight Connector 90">
-            <a:extLst>
-              <a:ext uri="{FF2B5EF4-FFF2-40B4-BE49-F238E27FC236}">
-                <a16:creationId xmlns:a16="http://schemas.microsoft.com/office/drawing/2014/main" id="{54F19CD3-F935-3C4A-B8A7-5375ECFA1876}"/>
-              </a:ext>
-            </a:extLst>
-          </p:cNvPr>
-          <p:cNvCxnSpPr>
-            <a:cxnSpLocks/>
-          </p:cNvCxnSpPr>
-          <p:nvPr/>
-        </p:nvCxnSpPr>
-        <p:spPr>
-          <a:xfrm>
-            <a:off x="9923401" y="1006485"/>
-            <a:ext cx="360000" cy="4127"/>
-          </a:xfrm>
-          <a:prstGeom prst="line">
-            <a:avLst/>
-          </a:prstGeom>
-          <a:ln w="57150">
-            <a:tailEnd type="triangle"/>
-          </a:ln>
-        </p:spPr>
-        <p:style>
-          <a:lnRef idx="1">
-            <a:schemeClr val="dk1"/>
-          </a:lnRef>
-          <a:fillRef idx="0">
-            <a:schemeClr val="dk1"/>
-          </a:fillRef>
-          <a:effectRef idx="0">
-            <a:schemeClr val="dk1"/>
-          </a:effectRef>
-          <a:fontRef idx="minor">
-            <a:schemeClr val="tx1"/>
-          </a:fontRef>
-        </p:style>
-      </p:cxnSp>
-      <p:cxnSp>
-        <p:nvCxnSpPr>
           <p:cNvPr id="93" name="Straight Connector 92">
             <a:extLst>
               <a:ext uri="{FF2B5EF4-FFF2-40B4-BE49-F238E27FC236}">
@@ -7071,6 +7030,47 @@
           </a:ln>
         </p:spPr>
       </p:pic>
+      <p:cxnSp>
+        <p:nvCxnSpPr>
+          <p:cNvPr id="2" name="Straight Connector 1">
+            <a:extLst>
+              <a:ext uri="{FF2B5EF4-FFF2-40B4-BE49-F238E27FC236}">
+                <a16:creationId xmlns:a16="http://schemas.microsoft.com/office/drawing/2014/main" id="{33FBC82C-F11F-29EA-BBEF-CC134ED66133}"/>
+              </a:ext>
+            </a:extLst>
+          </p:cNvPr>
+          <p:cNvCxnSpPr>
+            <a:cxnSpLocks/>
+          </p:cNvCxnSpPr>
+          <p:nvPr/>
+        </p:nvCxnSpPr>
+        <p:spPr>
+          <a:xfrm>
+            <a:off x="9915394" y="1010612"/>
+            <a:ext cx="360000" cy="0"/>
+          </a:xfrm>
+          <a:prstGeom prst="line">
+            <a:avLst/>
+          </a:prstGeom>
+          <a:ln w="57150">
+            <a:tailEnd type="triangle"/>
+          </a:ln>
+        </p:spPr>
+        <p:style>
+          <a:lnRef idx="1">
+            <a:schemeClr val="dk1"/>
+          </a:lnRef>
+          <a:fillRef idx="0">
+            <a:schemeClr val="dk1"/>
+          </a:fillRef>
+          <a:effectRef idx="0">
+            <a:schemeClr val="dk1"/>
+          </a:effectRef>
+          <a:fontRef idx="minor">
+            <a:schemeClr val="tx1"/>
+          </a:fontRef>
+        </p:style>
+      </p:cxnSp>
     </p:spTree>
     <p:extLst>
       <p:ext uri="{BB962C8B-B14F-4D97-AF65-F5344CB8AC3E}">

</xml_diff>